<commit_message>
python -m pip install --upgrade -pip
</commit_message>
<xml_diff>
--- a/Pro_report_2018.pptx
+++ b/Pro_report_2018.pptx
@@ -8040,7 +8040,27 @@
                 <a:latin typeface="Tahoma" panose="020B0604030504040204" pitchFamily="34" charset="0"/>
                 <a:cs typeface="Tahoma" panose="020B0604030504040204" pitchFamily="34" charset="0"/>
               </a:rPr>
-              <a:t> -&gt; python -m pip --upgrade pip</a:t>
+              <a:t> -&gt; python -m pip </a:t>
+            </a:r>
+            <a:r>
+              <a:rPr lang="en-GB" sz="2400" dirty="0" smtClean="0">
+                <a:solidFill>
+                  <a:srgbClr val="00B050"/>
+                </a:solidFill>
+                <a:latin typeface="Tahoma" panose="020B0604030504040204" pitchFamily="34" charset="0"/>
+                <a:cs typeface="Tahoma" panose="020B0604030504040204" pitchFamily="34" charset="0"/>
+              </a:rPr>
+              <a:t>install --</a:t>
+            </a:r>
+            <a:r>
+              <a:rPr lang="en-GB" sz="2400" dirty="0">
+                <a:solidFill>
+                  <a:srgbClr val="00B050"/>
+                </a:solidFill>
+                <a:latin typeface="Tahoma" panose="020B0604030504040204" pitchFamily="34" charset="0"/>
+                <a:cs typeface="Tahoma" panose="020B0604030504040204" pitchFamily="34" charset="0"/>
+              </a:rPr>
+              <a:t>upgrade pip</a:t>
             </a:r>
           </a:p>
         </p:txBody>
@@ -8183,7 +8203,7 @@
               <a:t>pivottablejs</a:t>
             </a:r>
             <a:r>
-              <a:rPr lang="en-GB" sz="2400" dirty="0" smtClean="0">
+              <a:rPr lang="en-GB" sz="2400" smtClean="0">
                 <a:solidFill>
                   <a:srgbClr val="00B050"/>
                 </a:solidFill>
@@ -8193,17 +8213,17 @@
               <a:t> </a:t>
             </a:r>
             <a:r>
-              <a:rPr lang="en-GB" sz="2400" dirty="0" smtClean="0">
+              <a:rPr lang="en-GB" sz="2400" smtClean="0">
                 <a:solidFill>
                   <a:srgbClr val="FF0000"/>
                 </a:solidFill>
                 <a:latin typeface="Tahoma" panose="020B0604030504040204" pitchFamily="34" charset="0"/>
                 <a:cs typeface="Tahoma" panose="020B0604030504040204" pitchFamily="34" charset="0"/>
               </a:rPr>
-              <a:t>or</a:t>
-            </a:r>
-            <a:r>
-              <a:rPr lang="en-GB" sz="2400" dirty="0" smtClean="0">
+              <a:t>and</a:t>
+            </a:r>
+            <a:r>
+              <a:rPr lang="en-GB" sz="2400" smtClean="0">
                 <a:solidFill>
                   <a:srgbClr val="00B050"/>
                 </a:solidFill>

</xml_diff>